<commit_message>
Minor formatting changes on poster
</commit_message>
<xml_diff>
--- a/Poster/NPdiffusionPoster_Rick.pptx
+++ b/Poster/NPdiffusionPoster_Rick.pptx
@@ -303,7 +303,7 @@
             <a:fld id="{7F4B0734-A6DD-4AB2-9AC3-E96A7B3E9E0B}" type="datetimeFigureOut">
               <a:rPr lang="en-US" smtClean="0"/>
               <a:pPr/>
-              <a:t>3/11/2016</a:t>
+              <a:t>3/11/16</a:t>
             </a:fld>
             <a:endParaRPr lang="en-US"/>
           </a:p>
@@ -468,7 +468,7 @@
             <a:fld id="{7F4B0734-A6DD-4AB2-9AC3-E96A7B3E9E0B}" type="datetimeFigureOut">
               <a:rPr lang="en-US" smtClean="0"/>
               <a:pPr/>
-              <a:t>3/11/2016</a:t>
+              <a:t>3/11/16</a:t>
             </a:fld>
             <a:endParaRPr lang="en-US"/>
           </a:p>
@@ -643,7 +643,7 @@
             <a:fld id="{7F4B0734-A6DD-4AB2-9AC3-E96A7B3E9E0B}" type="datetimeFigureOut">
               <a:rPr lang="en-US" smtClean="0"/>
               <a:pPr/>
-              <a:t>3/11/2016</a:t>
+              <a:t>3/11/16</a:t>
             </a:fld>
             <a:endParaRPr lang="en-US"/>
           </a:p>
@@ -808,7 +808,7 @@
             <a:fld id="{7F4B0734-A6DD-4AB2-9AC3-E96A7B3E9E0B}" type="datetimeFigureOut">
               <a:rPr lang="en-US" smtClean="0"/>
               <a:pPr/>
-              <a:t>3/11/2016</a:t>
+              <a:t>3/11/16</a:t>
             </a:fld>
             <a:endParaRPr lang="en-US"/>
           </a:p>
@@ -1050,7 +1050,7 @@
             <a:fld id="{7F4B0734-A6DD-4AB2-9AC3-E96A7B3E9E0B}" type="datetimeFigureOut">
               <a:rPr lang="en-US" smtClean="0"/>
               <a:pPr/>
-              <a:t>3/11/2016</a:t>
+              <a:t>3/11/16</a:t>
             </a:fld>
             <a:endParaRPr lang="en-US"/>
           </a:p>
@@ -1332,7 +1332,7 @@
             <a:fld id="{7F4B0734-A6DD-4AB2-9AC3-E96A7B3E9E0B}" type="datetimeFigureOut">
               <a:rPr lang="en-US" smtClean="0"/>
               <a:pPr/>
-              <a:t>3/11/2016</a:t>
+              <a:t>3/11/16</a:t>
             </a:fld>
             <a:endParaRPr lang="en-US"/>
           </a:p>
@@ -1753,7 +1753,7 @@
             <a:fld id="{7F4B0734-A6DD-4AB2-9AC3-E96A7B3E9E0B}" type="datetimeFigureOut">
               <a:rPr lang="en-US" smtClean="0"/>
               <a:pPr/>
-              <a:t>3/11/2016</a:t>
+              <a:t>3/11/16</a:t>
             </a:fld>
             <a:endParaRPr lang="en-US"/>
           </a:p>
@@ -1867,7 +1867,7 @@
             <a:fld id="{7F4B0734-A6DD-4AB2-9AC3-E96A7B3E9E0B}" type="datetimeFigureOut">
               <a:rPr lang="en-US" smtClean="0"/>
               <a:pPr/>
-              <a:t>3/11/2016</a:t>
+              <a:t>3/11/16</a:t>
             </a:fld>
             <a:endParaRPr lang="en-US"/>
           </a:p>
@@ -1959,7 +1959,7 @@
             <a:fld id="{7F4B0734-A6DD-4AB2-9AC3-E96A7B3E9E0B}" type="datetimeFigureOut">
               <a:rPr lang="en-US" smtClean="0"/>
               <a:pPr/>
-              <a:t>3/11/2016</a:t>
+              <a:t>3/11/16</a:t>
             </a:fld>
             <a:endParaRPr lang="en-US"/>
           </a:p>
@@ -2231,7 +2231,7 @@
             <a:fld id="{7F4B0734-A6DD-4AB2-9AC3-E96A7B3E9E0B}" type="datetimeFigureOut">
               <a:rPr lang="en-US" smtClean="0"/>
               <a:pPr/>
-              <a:t>3/11/2016</a:t>
+              <a:t>3/11/16</a:t>
             </a:fld>
             <a:endParaRPr lang="en-US"/>
           </a:p>
@@ -2480,7 +2480,7 @@
             <a:fld id="{7F4B0734-A6DD-4AB2-9AC3-E96A7B3E9E0B}" type="datetimeFigureOut">
               <a:rPr lang="en-US" smtClean="0"/>
               <a:pPr/>
-              <a:t>3/11/2016</a:t>
+              <a:t>3/11/16</a:t>
             </a:fld>
             <a:endParaRPr lang="en-US"/>
           </a:p>
@@ -2688,7 +2688,7 @@
             <a:fld id="{7F4B0734-A6DD-4AB2-9AC3-E96A7B3E9E0B}" type="datetimeFigureOut">
               <a:rPr lang="en-US" smtClean="0"/>
               <a:pPr/>
-              <a:t>3/11/2016</a:t>
+              <a:t>3/11/16</a:t>
             </a:fld>
             <a:endParaRPr lang="en-US"/>
           </a:p>
@@ -4002,7 +4002,7 @@
         </p:nvSpPr>
         <p:spPr bwMode="auto">
           <a:xfrm>
-            <a:off x="270913" y="10117930"/>
+            <a:off x="270913" y="10098880"/>
             <a:ext cx="11874795" cy="707886"/>
           </a:xfrm>
           <a:prstGeom prst="rect">
@@ -4161,7 +4161,7 @@
                         <m:sSubPr>
                           <m:ctrlPr>
                             <a:rPr lang="en-US" sz="3200" b="0" i="1" smtClean="0">
-                              <a:latin typeface="Cambria Math" panose="02040503050406030204" pitchFamily="18" charset="0"/>
+                              <a:latin typeface="Cambria Math" charset="0"/>
                             </a:rPr>
                           </m:ctrlPr>
                         </m:sSubPr>
@@ -4192,7 +4192,7 @@
                         <m:fPr>
                           <m:ctrlPr>
                             <a:rPr lang="bg-BG" sz="3200" b="0" i="1" smtClean="0">
-                              <a:latin typeface="Cambria Math" panose="02040503050406030204" pitchFamily="18" charset="0"/>
+                              <a:latin typeface="Cambria Math" charset="0"/>
                             </a:rPr>
                           </m:ctrlPr>
                         </m:fPr>
@@ -4215,7 +4215,7 @@
                             <m:sSupPr>
                               <m:ctrlPr>
                                 <a:rPr lang="en-US" sz="3200" b="0" i="1" smtClean="0">
-                                  <a:latin typeface="Cambria Math" panose="02040503050406030204" pitchFamily="18" charset="0"/>
+                                  <a:latin typeface="Cambria Math" charset="0"/>
                                   <a:ea typeface="Cambria Math" charset="0"/>
                                   <a:cs typeface="Cambria Math" charset="0"/>
                                 </a:rPr>
@@ -4360,10 +4360,10 @@
         </p:nvGrpSpPr>
         <p:grpSpPr>
           <a:xfrm>
-            <a:off x="8300525" y="11192764"/>
-            <a:ext cx="3845183" cy="10057958"/>
-            <a:chOff x="8300525" y="11192764"/>
-            <a:chExt cx="3845183" cy="10057958"/>
+            <a:off x="8303342" y="11192764"/>
+            <a:ext cx="3842366" cy="10057958"/>
+            <a:chOff x="8303342" y="11192764"/>
+            <a:chExt cx="3842366" cy="10057958"/>
           </a:xfrm>
         </p:grpSpPr>
         <p:pic>
@@ -4400,7 +4400,7 @@
           </p:nvSpPr>
           <p:spPr bwMode="auto">
             <a:xfrm>
-              <a:off x="8300525" y="11283450"/>
+              <a:off x="8325239" y="11239686"/>
               <a:ext cx="2583788" cy="400110"/>
             </a:xfrm>
             <a:prstGeom prst="rect">
@@ -4468,7 +4468,7 @@
         </p:nvSpPr>
         <p:spPr>
           <a:xfrm>
-            <a:off x="487502" y="25108281"/>
+            <a:off x="388646" y="25132995"/>
             <a:ext cx="2499996" cy="3139321"/>
           </a:xfrm>
           <a:prstGeom prst="rect">
@@ -4477,7 +4477,7 @@
           <a:noFill/>
           <a:ln w="19050">
             <a:solidFill>
-              <a:schemeClr val="tx2"/>
+              <a:schemeClr val="tx1"/>
             </a:solidFill>
           </a:ln>
         </p:spPr>
@@ -4488,83 +4488,43 @@
           <a:lstStyle/>
           <a:p>
             <a:r>
-              <a:rPr lang="en-US" sz="2200" dirty="0" smtClean="0">
-                <a:solidFill>
-                  <a:schemeClr val="tx2"/>
-                </a:solidFill>
-              </a:rPr>
+              <a:rPr lang="en-US" sz="2200" dirty="0" smtClean="0"/>
               <a:t>The output plots show populations of calculated </a:t>
             </a:r>
             <a:r>
-              <a:rPr lang="en-US" sz="2200" dirty="0" err="1" smtClean="0">
-                <a:solidFill>
-                  <a:schemeClr val="tx2"/>
-                </a:solidFill>
-              </a:rPr>
+              <a:rPr lang="en-US" sz="2200" dirty="0" err="1" smtClean="0"/>
               <a:t>D</a:t>
             </a:r>
             <a:r>
-              <a:rPr lang="en-US" sz="2200" baseline="-25000" dirty="0" err="1" smtClean="0">
-                <a:solidFill>
-                  <a:schemeClr val="tx2"/>
-                </a:solidFill>
-              </a:rPr>
+              <a:rPr lang="en-US" sz="2200" baseline="-25000" dirty="0" err="1" smtClean="0"/>
               <a:t>eff</a:t>
             </a:r>
             <a:r>
-              <a:rPr lang="en-US" sz="2200" dirty="0" err="1" smtClean="0">
-                <a:solidFill>
-                  <a:schemeClr val="tx2"/>
-                </a:solidFill>
-              </a:rPr>
+              <a:rPr lang="en-US" sz="2200" dirty="0" err="1" smtClean="0"/>
               <a:t>s</a:t>
             </a:r>
             <a:r>
-              <a:rPr lang="en-US" sz="2200" dirty="0" smtClean="0">
-                <a:solidFill>
-                  <a:schemeClr val="tx2"/>
-                </a:solidFill>
-              </a:rPr>
+              <a:rPr lang="en-US" sz="2200" dirty="0" smtClean="0"/>
               <a:t> and how they compare with other particle chemistries over the input </a:t>
             </a:r>
             <a:r>
-              <a:rPr lang="en-US" sz="2200" dirty="0" err="1" smtClean="0">
-                <a:solidFill>
-                  <a:schemeClr val="tx2"/>
-                </a:solidFill>
-              </a:rPr>
+              <a:rPr lang="en-US" sz="2200" dirty="0" err="1" smtClean="0"/>
               <a:t>timepoints</a:t>
             </a:r>
             <a:r>
-              <a:rPr lang="en-US" sz="2200" dirty="0" smtClean="0">
-                <a:solidFill>
-                  <a:schemeClr val="tx2"/>
-                </a:solidFill>
-              </a:rPr>
+              <a:rPr lang="en-US" sz="2200" dirty="0" smtClean="0"/>
               <a:t> before outputting mean </a:t>
             </a:r>
             <a:r>
-              <a:rPr lang="en-US" sz="2200" dirty="0" err="1" smtClean="0">
-                <a:solidFill>
-                  <a:schemeClr val="tx2"/>
-                </a:solidFill>
-              </a:rPr>
+              <a:rPr lang="en-US" sz="2200" dirty="0" err="1" smtClean="0"/>
               <a:t>D</a:t>
             </a:r>
             <a:r>
-              <a:rPr lang="en-US" sz="2200" baseline="-25000" dirty="0" err="1" smtClean="0">
-                <a:solidFill>
-                  <a:schemeClr val="tx2"/>
-                </a:solidFill>
-              </a:rPr>
+              <a:rPr lang="en-US" sz="2200" baseline="-25000" dirty="0" err="1" smtClean="0"/>
               <a:t>eff</a:t>
             </a:r>
             <a:r>
-              <a:rPr lang="en-US" sz="2200" dirty="0" smtClean="0">
-                <a:solidFill>
-                  <a:schemeClr val="tx2"/>
-                </a:solidFill>
-              </a:rPr>
+              <a:rPr lang="en-US" sz="2200" dirty="0" smtClean="0"/>
               <a:t> values.</a:t>
             </a:r>
           </a:p>
@@ -4586,7 +4546,7 @@
         </p:blipFill>
         <p:spPr>
           <a:xfrm>
-            <a:off x="547033" y="21539428"/>
+            <a:off x="868315" y="21465286"/>
             <a:ext cx="9904947" cy="254439"/>
           </a:xfrm>
           <a:prstGeom prst="rect">

</xml_diff>